<commit_message>
cleaned repository, updated links on slidedeck
</commit_message>
<xml_diff>
--- a/presentation/Group3_NFL_slides.pptx
+++ b/presentation/Group3_NFL_slides.pptx
@@ -236,7 +236,7 @@
           <a:p>
             <a:fld id="{EB8C2E64-CB28-4980-BDE7-53D94BC7D1A0}" type="datetimeFigureOut">
               <a:rPr lang="en-US" smtClean="0"/>
-              <a:t>4/23/2023</a:t>
+              <a:t>4/24/2023</a:t>
             </a:fld>
             <a:endParaRPr lang="en-US"/>
           </a:p>
@@ -414,7 +414,7 @@
             <a:fld id="{7663E9E0-D922-418E-8BFA-E41C87CB1E68}" type="datetimeFigureOut">
               <a:rPr lang="en-US" smtClean="0"/>
               <a:pPr/>
-              <a:t>4/23/2023</a:t>
+              <a:t>4/24/2023</a:t>
             </a:fld>
             <a:endParaRPr lang="en-US" dirty="0"/>
           </a:p>
@@ -11028,8 +11028,8 @@
         </p:nvSpPr>
         <p:spPr>
           <a:xfrm>
-            <a:off x="3106675" y="1418332"/>
-            <a:ext cx="3294125" cy="830997"/>
+            <a:off x="3056045" y="1412419"/>
+            <a:ext cx="3294125" cy="584775"/>
           </a:xfrm>
           <a:prstGeom prst="rect">
             <a:avLst/>
@@ -11054,7 +11054,15 @@
                   </a:schemeClr>
                 </a:solidFill>
               </a:rPr>
-              <a:t>Deployed to render</a:t>
+              <a:t>Deployed to </a:t>
+            </a:r>
+            <a:r>
+              <a:rPr lang="en-US" sz="1600" b="1" dirty="0">
+                <a:solidFill>
+                  <a:srgbClr val="002060"/>
+                </a:solidFill>
+              </a:rPr>
+              <a:t>AWS</a:t>
             </a:r>
           </a:p>
           <a:p>
@@ -11070,25 +11078,7 @@
                   </a:schemeClr>
                 </a:solidFill>
               </a:rPr>
-              <a:t>Used</a:t>
-            </a:r>
-            <a:r>
-              <a:rPr lang="en-US" sz="1600" b="1" dirty="0">
-                <a:solidFill>
-                  <a:schemeClr val="bg1">
-                    <a:lumMod val="50000"/>
-                  </a:schemeClr>
-                </a:solidFill>
-              </a:rPr>
-              <a:t> </a:t>
-            </a:r>
-            <a:r>
-              <a:rPr lang="en-US" sz="1600" b="1" dirty="0" err="1">
-                <a:solidFill>
-                  <a:srgbClr val="002060"/>
-                </a:solidFill>
-              </a:rPr>
-              <a:t>guincorn</a:t>
+              <a:t>Deployed to </a:t>
             </a:r>
             <a:r>
               <a:rPr lang="en-US" sz="1600" b="1" dirty="0">
@@ -11096,17 +11086,7 @@
                   <a:srgbClr val="002060"/>
                 </a:solidFill>
               </a:rPr>
-              <a:t> </a:t>
-            </a:r>
-            <a:r>
-              <a:rPr lang="en-US" sz="1600" dirty="0">
-                <a:solidFill>
-                  <a:schemeClr val="bg1">
-                    <a:lumMod val="50000"/>
-                  </a:schemeClr>
-                </a:solidFill>
-              </a:rPr>
-              <a:t>for web deployment</a:t>
+              <a:t>GitHub Pages</a:t>
             </a:r>
           </a:p>
         </p:txBody>
@@ -11197,8 +11177,8 @@
         </p:nvSpPr>
         <p:spPr>
           <a:xfrm>
-            <a:off x="5638800" y="3421618"/>
-            <a:ext cx="3762746" cy="353943"/>
+            <a:off x="6004556" y="3389660"/>
+            <a:ext cx="2983230" cy="646331"/>
           </a:xfrm>
           <a:prstGeom prst="rect">
             <a:avLst/>
@@ -11306,23 +11286,180 @@
           </a:lstStyle>
           <a:p>
             <a:r>
-              <a:rPr lang="en-CA" sz="1700" b="1" i="0" u="none" strike="noStrike" dirty="0">
+              <a:rPr lang="en-CA" sz="1400" b="1" i="0" u="none" strike="noStrike" dirty="0">
+                <a:solidFill>
+                  <a:srgbClr val="FF0000"/>
+                </a:solidFill>
+                <a:effectLst/>
+                <a:latin typeface="Slack-Lato"/>
+              </a:rPr>
+              <a:t>AWS:</a:t>
+            </a:r>
+          </a:p>
+          <a:p>
+            <a:r>
+              <a:rPr lang="en-CA" sz="1100" b="1" i="0" u="none" strike="noStrike" dirty="0">
                 <a:solidFill>
                   <a:srgbClr val="002060"/>
                 </a:solidFill>
                 <a:effectLst/>
                 <a:latin typeface="Slack-Lato"/>
-                <a:hlinkClick r:id="rId3">
-                  <a:extLst>
-                    <a:ext uri="{A12FA001-AC4F-418D-AE19-62706E023703}">
-                      <ahyp:hlinkClr xmlns:ahyp="http://schemas.microsoft.com/office/drawing/2018/hyperlinkcolor" val="tx"/>
-                    </a:ext>
-                  </a:extLst>
-                </a:hlinkClick>
               </a:rPr>
-              <a:t>https://nfl-dashboard.onrender.com/</a:t>
+              <a:t>https://flask-service.ofeg1bv1af188.ca-central-1.cs.amazonlightsail.com/index.html</a:t>
             </a:r>
-            <a:endParaRPr lang="en-CA" sz="1700" b="1" dirty="0">
+            <a:endParaRPr lang="en-CA" sz="1100" b="1" dirty="0">
+              <a:solidFill>
+                <a:srgbClr val="002060"/>
+              </a:solidFill>
+            </a:endParaRPr>
+          </a:p>
+        </p:txBody>
+      </p:sp>
+      <p:sp>
+        <p:nvSpPr>
+          <p:cNvPr id="9" name="TextBox 20">
+            <a:extLst>
+              <a:ext uri="{FF2B5EF4-FFF2-40B4-BE49-F238E27FC236}">
+                <a16:creationId xmlns:a16="http://schemas.microsoft.com/office/drawing/2014/main" id="{F96024F5-6C75-D6D1-9A3E-94E1110479DE}"/>
+              </a:ext>
+            </a:extLst>
+          </p:cNvPr>
+          <p:cNvSpPr txBox="1"/>
+          <p:nvPr/>
+        </p:nvSpPr>
+        <p:spPr>
+          <a:xfrm>
+            <a:off x="5996518" y="4140790"/>
+            <a:ext cx="2740994" cy="646331"/>
+          </a:xfrm>
+          <a:prstGeom prst="rect">
+            <a:avLst/>
+          </a:prstGeom>
+          <a:noFill/>
+        </p:spPr>
+        <p:txBody>
+          <a:bodyPr wrap="square" rtlCol="0">
+            <a:spAutoFit/>
+          </a:bodyPr>
+          <a:lstStyle>
+            <a:defPPr>
+              <a:defRPr lang="en-US"/>
+            </a:defPPr>
+            <a:lvl1pPr marL="0" algn="l" defTabSz="914400" rtl="0" eaLnBrk="1" latinLnBrk="0" hangingPunct="1">
+              <a:defRPr sz="1800" kern="1200">
+                <a:solidFill>
+                  <a:schemeClr val="tx1"/>
+                </a:solidFill>
+                <a:latin typeface="+mn-lt"/>
+                <a:ea typeface="+mn-ea"/>
+                <a:cs typeface="+mn-cs"/>
+              </a:defRPr>
+            </a:lvl1pPr>
+            <a:lvl2pPr marL="457200" algn="l" defTabSz="914400" rtl="0" eaLnBrk="1" latinLnBrk="0" hangingPunct="1">
+              <a:defRPr sz="1800" kern="1200">
+                <a:solidFill>
+                  <a:schemeClr val="tx1"/>
+                </a:solidFill>
+                <a:latin typeface="+mn-lt"/>
+                <a:ea typeface="+mn-ea"/>
+                <a:cs typeface="+mn-cs"/>
+              </a:defRPr>
+            </a:lvl2pPr>
+            <a:lvl3pPr marL="914400" algn="l" defTabSz="914400" rtl="0" eaLnBrk="1" latinLnBrk="0" hangingPunct="1">
+              <a:defRPr sz="1800" kern="1200">
+                <a:solidFill>
+                  <a:schemeClr val="tx1"/>
+                </a:solidFill>
+                <a:latin typeface="+mn-lt"/>
+                <a:ea typeface="+mn-ea"/>
+                <a:cs typeface="+mn-cs"/>
+              </a:defRPr>
+            </a:lvl3pPr>
+            <a:lvl4pPr marL="1371600" algn="l" defTabSz="914400" rtl="0" eaLnBrk="1" latinLnBrk="0" hangingPunct="1">
+              <a:defRPr sz="1800" kern="1200">
+                <a:solidFill>
+                  <a:schemeClr val="tx1"/>
+                </a:solidFill>
+                <a:latin typeface="+mn-lt"/>
+                <a:ea typeface="+mn-ea"/>
+                <a:cs typeface="+mn-cs"/>
+              </a:defRPr>
+            </a:lvl4pPr>
+            <a:lvl5pPr marL="1828800" algn="l" defTabSz="914400" rtl="0" eaLnBrk="1" latinLnBrk="0" hangingPunct="1">
+              <a:defRPr sz="1800" kern="1200">
+                <a:solidFill>
+                  <a:schemeClr val="tx1"/>
+                </a:solidFill>
+                <a:latin typeface="+mn-lt"/>
+                <a:ea typeface="+mn-ea"/>
+                <a:cs typeface="+mn-cs"/>
+              </a:defRPr>
+            </a:lvl5pPr>
+            <a:lvl6pPr marL="2286000" algn="l" defTabSz="914400" rtl="0" eaLnBrk="1" latinLnBrk="0" hangingPunct="1">
+              <a:defRPr sz="1800" kern="1200">
+                <a:solidFill>
+                  <a:schemeClr val="tx1"/>
+                </a:solidFill>
+                <a:latin typeface="+mn-lt"/>
+                <a:ea typeface="+mn-ea"/>
+                <a:cs typeface="+mn-cs"/>
+              </a:defRPr>
+            </a:lvl6pPr>
+            <a:lvl7pPr marL="2743200" algn="l" defTabSz="914400" rtl="0" eaLnBrk="1" latinLnBrk="0" hangingPunct="1">
+              <a:defRPr sz="1800" kern="1200">
+                <a:solidFill>
+                  <a:schemeClr val="tx1"/>
+                </a:solidFill>
+                <a:latin typeface="+mn-lt"/>
+                <a:ea typeface="+mn-ea"/>
+                <a:cs typeface="+mn-cs"/>
+              </a:defRPr>
+            </a:lvl7pPr>
+            <a:lvl8pPr marL="3200400" algn="l" defTabSz="914400" rtl="0" eaLnBrk="1" latinLnBrk="0" hangingPunct="1">
+              <a:defRPr sz="1800" kern="1200">
+                <a:solidFill>
+                  <a:schemeClr val="tx1"/>
+                </a:solidFill>
+                <a:latin typeface="+mn-lt"/>
+                <a:ea typeface="+mn-ea"/>
+                <a:cs typeface="+mn-cs"/>
+              </a:defRPr>
+            </a:lvl8pPr>
+            <a:lvl9pPr marL="3657600" algn="l" defTabSz="914400" rtl="0" eaLnBrk="1" latinLnBrk="0" hangingPunct="1">
+              <a:defRPr sz="1800" kern="1200">
+                <a:solidFill>
+                  <a:schemeClr val="tx1"/>
+                </a:solidFill>
+                <a:latin typeface="+mn-lt"/>
+                <a:ea typeface="+mn-ea"/>
+                <a:cs typeface="+mn-cs"/>
+              </a:defRPr>
+            </a:lvl9pPr>
+          </a:lstStyle>
+          <a:p>
+            <a:r>
+              <a:rPr lang="en-CA" sz="1400" b="1" i="0" u="none" strike="noStrike" dirty="0">
+                <a:solidFill>
+                  <a:srgbClr val="FF0000"/>
+                </a:solidFill>
+                <a:effectLst/>
+                <a:latin typeface="Slack-Lato"/>
+              </a:rPr>
+              <a:t>GitHub Pages:</a:t>
+            </a:r>
+          </a:p>
+          <a:p>
+            <a:r>
+              <a:rPr lang="en-CA" sz="1100" b="1" i="0" u="none" strike="noStrike" dirty="0">
+                <a:solidFill>
+                  <a:srgbClr val="002060"/>
+                </a:solidFill>
+                <a:effectLst/>
+                <a:latin typeface="Slack-Lato"/>
+              </a:rPr>
+              <a:t>https://gusmendesbh.github.io/project3-group1/index.html</a:t>
+            </a:r>
+            <a:endParaRPr lang="en-CA" sz="1100" b="1" dirty="0">
               <a:solidFill>
                 <a:srgbClr val="002060"/>
               </a:solidFill>
@@ -13768,7 +13905,7 @@
           <p:nvPr/>
         </p:nvPicPr>
         <p:blipFill>
-          <a:blip r:embed="rId4" cstate="print">
+          <a:blip cstate="print">
             <a:extLst>
               <a:ext uri="{28A0092B-C50C-407E-A947-70E740481C1C}">
                 <a14:useLocalDpi xmlns:a14="http://schemas.microsoft.com/office/drawing/2010/main" val="0"/>

</xml_diff>